<commit_message>
fix: ajustando gráfico ppt
</commit_message>
<xml_diff>
--- a/Projeto - SPTrans.pptx
+++ b/Projeto - SPTrans.pptx
@@ -163,12 +163,32 @@
               </a:defRPr>
             </a:pPr>
             <a:r>
-              <a:rPr lang="en-US"/>
+              <a:rPr lang="en-US" dirty="0" err="1"/>
               <a:t>Passageiro</a:t>
             </a:r>
             <a:r>
-              <a:rPr lang="en-US" baseline="0"/>
-              <a:t> Transportados SPTrans</a:t>
+              <a:rPr lang="en-US" baseline="0" dirty="0"/>
+              <a:t> </a:t>
+            </a:r>
+            <a:r>
+              <a:rPr lang="en-US" baseline="0" dirty="0" err="1"/>
+              <a:t>Transportados</a:t>
+            </a:r>
+            <a:r>
+              <a:rPr lang="en-US" baseline="0" dirty="0"/>
+              <a:t>  </a:t>
+            </a:r>
+            <a:r>
+              <a:rPr lang="en-US" sz="1100" baseline="0" dirty="0"/>
+              <a:t>(em </a:t>
+            </a:r>
+            <a:r>
+              <a:rPr lang="en-US" sz="1100" baseline="0" dirty="0" err="1"/>
+              <a:t>Bilhões</a:t>
+            </a:r>
+            <a:r>
+              <a:rPr lang="en-US" sz="1100" baseline="0" dirty="0"/>
+              <a:t>)</a:t>
             </a:r>
           </a:p>
           <a:p>
@@ -176,8 +196,60 @@
               <a:defRPr/>
             </a:pPr>
             <a:r>
-              <a:rPr lang="en-US" sz="900" baseline="0"/>
-              <a:t>Todas os passageiros de são paulo  nos anos 2003 - 2024</a:t>
+              <a:rPr lang="en-US" sz="900" baseline="0" dirty="0" err="1"/>
+              <a:t>Todas</a:t>
+            </a:r>
+            <a:r>
+              <a:rPr lang="en-US" sz="900" baseline="0" dirty="0"/>
+              <a:t> </a:t>
+            </a:r>
+            <a:r>
+              <a:rPr lang="en-US" sz="900" baseline="0" dirty="0" err="1"/>
+              <a:t>os</a:t>
+            </a:r>
+            <a:r>
+              <a:rPr lang="en-US" sz="900" baseline="0" dirty="0"/>
+              <a:t> </a:t>
+            </a:r>
+            <a:r>
+              <a:rPr lang="en-US" sz="900" baseline="0" dirty="0" err="1"/>
+              <a:t>passageiros</a:t>
+            </a:r>
+            <a:r>
+              <a:rPr lang="en-US" sz="900" baseline="0" dirty="0"/>
+              <a:t> de </a:t>
+            </a:r>
+            <a:r>
+              <a:rPr lang="en-US" sz="900" baseline="0" dirty="0" err="1"/>
+              <a:t>são</a:t>
+            </a:r>
+            <a:r>
+              <a:rPr lang="en-US" sz="900" baseline="0" dirty="0"/>
+              <a:t> </a:t>
+            </a:r>
+            <a:r>
+              <a:rPr lang="en-US" sz="900" baseline="0" dirty="0" err="1"/>
+              <a:t>paulo</a:t>
+            </a:r>
+            <a:r>
+              <a:rPr lang="en-US" sz="900" baseline="0" dirty="0"/>
+              <a:t>  </a:t>
+            </a:r>
+            <a:r>
+              <a:rPr lang="en-US" sz="900" baseline="0" dirty="0" err="1"/>
+              <a:t>nos</a:t>
+            </a:r>
+            <a:r>
+              <a:rPr lang="en-US" sz="900" baseline="0" dirty="0"/>
+              <a:t> </a:t>
+            </a:r>
+            <a:r>
+              <a:rPr lang="en-US" sz="900" baseline="0" dirty="0" err="1"/>
+              <a:t>anos</a:t>
+            </a:r>
+            <a:r>
+              <a:rPr lang="en-US" sz="900" baseline="0" dirty="0"/>
+              <a:t> 2003 - 2024</a:t>
             </a:r>
           </a:p>
         </c:rich>
@@ -7470,7 +7542,7 @@
           <p:nvPr>
             <p:extLst>
               <p:ext uri="{D42A27DB-BD31-4B8C-83A1-F6EECF244321}">
-                <p14:modId xmlns:p14="http://schemas.microsoft.com/office/powerpoint/2010/main" val="812719582"/>
+                <p14:modId xmlns:p14="http://schemas.microsoft.com/office/powerpoint/2010/main" val="1747622785"/>
               </p:ext>
             </p:extLst>
           </p:nvPr>
@@ -7786,23 +7858,48 @@
             <a:pPr algn="ctr"/>
             <a:r>
               <a:rPr lang="pt-BR" dirty="0"/>
-              <a:t>Dispersão da </a:t>
-            </a:r>
-            <a:r>
-              <a:rPr lang="pt-BR" dirty="0" err="1"/>
-              <a:t>popução</a:t>
-            </a:r>
-            <a:endParaRPr lang="pt-BR" dirty="0"/>
+              <a:t>Dispersão dos pontos de Ônibus</a:t>
+            </a:r>
           </a:p>
           <a:p>
             <a:pPr algn="ctr"/>
             <a:r>
               <a:rPr lang="pt-BR" sz="1100" dirty="0"/>
-              <a:t>Pontos de Ónibus em 2024</a:t>
-            </a:r>
-          </a:p>
-        </p:txBody>
-      </p:sp>
+              <a:t>Safra de Analise: Jan/2024</a:t>
+            </a:r>
+          </a:p>
+        </p:txBody>
+      </p:sp>
+      <p:pic>
+        <p:nvPicPr>
+          <p:cNvPr id="21" name="Imagem 20">
+            <a:extLst>
+              <a:ext uri="{FF2B5EF4-FFF2-40B4-BE49-F238E27FC236}">
+                <a16:creationId xmlns:a16="http://schemas.microsoft.com/office/drawing/2014/main" id="{FF77415C-9F93-AA7F-3986-CB91DF929BED}"/>
+              </a:ext>
+            </a:extLst>
+          </p:cNvPr>
+          <p:cNvPicPr>
+            <a:picLocks noChangeAspect="1"/>
+          </p:cNvPicPr>
+          <p:nvPr/>
+        </p:nvPicPr>
+        <p:blipFill>
+          <a:blip r:embed="rId12"/>
+          <a:stretch>
+            <a:fillRect/>
+          </a:stretch>
+        </p:blipFill>
+        <p:spPr>
+          <a:xfrm>
+            <a:off x="8407225" y="2322108"/>
+            <a:ext cx="3596531" cy="2759996"/>
+          </a:xfrm>
+          <a:prstGeom prst="rect">
+            <a:avLst/>
+          </a:prstGeom>
+        </p:spPr>
+      </p:pic>
     </p:spTree>
     <p:extLst>
       <p:ext uri="{BB962C8B-B14F-4D97-AF65-F5344CB8AC3E}">
@@ -8921,7 +9018,7 @@
             <a:pPr algn="ctr"/>
             <a:r>
               <a:rPr lang="pt-BR" sz="1100" dirty="0"/>
-              <a:t>Pontos de Ónibus em 2024</a:t>
+              <a:t>Pontos de Ônibus em 2024</a:t>
             </a:r>
           </a:p>
         </p:txBody>
@@ -9010,6 +9107,36 @@
           <a:xfrm>
             <a:off x="4250497" y="1200563"/>
             <a:ext cx="545024" cy="545024"/>
+          </a:xfrm>
+          <a:prstGeom prst="rect">
+            <a:avLst/>
+          </a:prstGeom>
+        </p:spPr>
+      </p:pic>
+      <p:pic>
+        <p:nvPicPr>
+          <p:cNvPr id="19" name="Imagem 18">
+            <a:extLst>
+              <a:ext uri="{FF2B5EF4-FFF2-40B4-BE49-F238E27FC236}">
+                <a16:creationId xmlns:a16="http://schemas.microsoft.com/office/drawing/2014/main" id="{3E5EA87B-BC4A-DC4E-F435-9035E761A49A}"/>
+              </a:ext>
+            </a:extLst>
+          </p:cNvPr>
+          <p:cNvPicPr>
+            <a:picLocks noChangeAspect="1"/>
+          </p:cNvPicPr>
+          <p:nvPr/>
+        </p:nvPicPr>
+        <p:blipFill>
+          <a:blip r:embed="rId15"/>
+          <a:stretch>
+            <a:fillRect/>
+          </a:stretch>
+        </p:blipFill>
+        <p:spPr>
+          <a:xfrm>
+            <a:off x="8407225" y="2322108"/>
+            <a:ext cx="3596531" cy="2759996"/>
           </a:xfrm>
           <a:prstGeom prst="rect">
             <a:avLst/>
@@ -9084,7 +9211,7 @@
               <a:rPr lang="pt-BR" sz="2800" dirty="0">
                 <a:latin typeface="Aptos Black" panose="020B0004020202020204" pitchFamily="34" charset="0"/>
               </a:rPr>
-              <a:t>SPTRANS | Sistema de Numeração dos Ónibus em São Paulo</a:t>
+              <a:t>SPTRANS | Sistema de Numeração dos Ônibus em São Paulo</a:t>
             </a:r>
           </a:p>
         </p:txBody>

</xml_diff>